<commit_message>
Adicionado POC1 - Interoperabilidade
</commit_message>
<xml_diff>
--- a/arquivos/poc/slides/POC1-Interoperabilidade.pptx
+++ b/arquivos/poc/slides/POC1-Interoperabilidade.pptx
@@ -104,7 +104,49 @@
       </a:defRPr>
     </a:lvl9pPr>
   </p:defaultTextStyle>
+  <p:extLst>
+    <p:ext uri="{EFAFB233-063F-42B5-8137-9DF3F51BA10A}">
+      <p15:sldGuideLst xmlns:p15="http://schemas.microsoft.com/office/powerpoint/2012/main"/>
+    </p:ext>
+  </p:extLst>
 </p:presentation>
+</file>
+
+<file path=ppt/revisionInfo.xml><?xml version="1.0" encoding="utf-8"?>
+<p1510:revInfo xmlns:a="http://schemas.openxmlformats.org/drawingml/2006/main" xmlns:r="http://schemas.openxmlformats.org/officeDocument/2006/relationships" xmlns:p1510="http://schemas.microsoft.com/office/powerpoint/2015/10/main">
+  <p1510:revLst>
+    <p1510:client id="{071D9468-FA46-4156-9FFD-107AD5E5EFE8}" v="1" dt="2022-02-06T19:45:56.853"/>
+  </p1510:revLst>
+</p1510:revInfo>
+</file>
+
+<file path=ppt/changesInfos/changesInfo1.xml><?xml version="1.0" encoding="utf-8"?>
+<pc:chgInfo xmlns:a="http://schemas.openxmlformats.org/drawingml/2006/main" xmlns:r="http://schemas.openxmlformats.org/officeDocument/2006/relationships" xmlns:ac="http://schemas.microsoft.com/office/drawing/2013/main/command" xmlns:pc="http://schemas.microsoft.com/office/powerpoint/2013/main/command">
+  <pc:docChgLst>
+    <pc:chgData name="Guilherme Lima" userId="576b90086f7cd605" providerId="LiveId" clId="{071D9468-FA46-4156-9FFD-107AD5E5EFE8}"/>
+    <pc:docChg chg="modSld">
+      <pc:chgData name="Guilherme Lima" userId="576b90086f7cd605" providerId="LiveId" clId="{071D9468-FA46-4156-9FFD-107AD5E5EFE8}" dt="2022-02-06T19:46:01.824" v="1" actId="1076"/>
+      <pc:docMkLst>
+        <pc:docMk/>
+      </pc:docMkLst>
+      <pc:sldChg chg="addSp modSp mod">
+        <pc:chgData name="Guilherme Lima" userId="576b90086f7cd605" providerId="LiveId" clId="{071D9468-FA46-4156-9FFD-107AD5E5EFE8}" dt="2022-02-06T19:46:01.824" v="1" actId="1076"/>
+        <pc:sldMkLst>
+          <pc:docMk/>
+          <pc:sldMk cId="2222553921" sldId="256"/>
+        </pc:sldMkLst>
+        <pc:spChg chg="add mod">
+          <ac:chgData name="Guilherme Lima" userId="576b90086f7cd605" providerId="LiveId" clId="{071D9468-FA46-4156-9FFD-107AD5E5EFE8}" dt="2022-02-06T19:46:01.824" v="1" actId="1076"/>
+          <ac:spMkLst>
+            <pc:docMk/>
+            <pc:sldMk cId="2222553921" sldId="256"/>
+            <ac:spMk id="6" creationId="{1525BD7A-C53E-4D02-9E4C-767195AD001B}"/>
+          </ac:spMkLst>
+        </pc:spChg>
+      </pc:sldChg>
+    </pc:docChg>
+  </pc:docChgLst>
+</pc:chgInfo>
 </file>
 
 <file path=ppt/slideLayouts/slideLayout1.xml><?xml version="1.0" encoding="utf-8"?>
@@ -4355,6 +4397,136 @@
           </a:p>
         </p:txBody>
       </p:sp>
+      <p:sp>
+        <p:nvSpPr>
+          <p:cNvPr id="6" name="Subtítulo 2">
+            <a:extLst>
+              <a:ext uri="{FF2B5EF4-FFF2-40B4-BE49-F238E27FC236}">
+                <a16:creationId xmlns:a16="http://schemas.microsoft.com/office/drawing/2014/main" id="{1525BD7A-C53E-4D02-9E4C-767195AD001B}"/>
+              </a:ext>
+            </a:extLst>
+          </p:cNvPr>
+          <p:cNvSpPr txBox="1">
+            <a:spLocks/>
+          </p:cNvSpPr>
+          <p:nvPr/>
+        </p:nvSpPr>
+        <p:spPr>
+          <a:xfrm>
+            <a:off x="1069848" y="5701179"/>
+            <a:ext cx="7891272" cy="489036"/>
+          </a:xfrm>
+          <a:prstGeom prst="rect">
+            <a:avLst/>
+          </a:prstGeom>
+        </p:spPr>
+        <p:txBody>
+          <a:bodyPr vert="horz" lIns="91440" tIns="45720" rIns="91440" bIns="45720" rtlCol="0">
+            <a:normAutofit/>
+          </a:bodyPr>
+          <a:lstStyle>
+            <a:defPPr>
+              <a:defRPr lang="en-US"/>
+            </a:defPPr>
+            <a:lvl1pPr marL="0" algn="l" defTabSz="457200" rtl="0" eaLnBrk="1" latinLnBrk="0" hangingPunct="1">
+              <a:defRPr sz="1800" kern="1200">
+                <a:solidFill>
+                  <a:schemeClr val="tx1"/>
+                </a:solidFill>
+                <a:latin typeface="+mn-lt"/>
+                <a:ea typeface="+mn-ea"/>
+                <a:cs typeface="+mn-cs"/>
+              </a:defRPr>
+            </a:lvl1pPr>
+            <a:lvl2pPr marL="457200" algn="l" defTabSz="457200" rtl="0" eaLnBrk="1" latinLnBrk="0" hangingPunct="1">
+              <a:defRPr sz="1800" kern="1200">
+                <a:solidFill>
+                  <a:schemeClr val="tx1"/>
+                </a:solidFill>
+                <a:latin typeface="+mn-lt"/>
+                <a:ea typeface="+mn-ea"/>
+                <a:cs typeface="+mn-cs"/>
+              </a:defRPr>
+            </a:lvl2pPr>
+            <a:lvl3pPr marL="914400" algn="l" defTabSz="457200" rtl="0" eaLnBrk="1" latinLnBrk="0" hangingPunct="1">
+              <a:defRPr sz="1800" kern="1200">
+                <a:solidFill>
+                  <a:schemeClr val="tx1"/>
+                </a:solidFill>
+                <a:latin typeface="+mn-lt"/>
+                <a:ea typeface="+mn-ea"/>
+                <a:cs typeface="+mn-cs"/>
+              </a:defRPr>
+            </a:lvl3pPr>
+            <a:lvl4pPr marL="1371600" algn="l" defTabSz="457200" rtl="0" eaLnBrk="1" latinLnBrk="0" hangingPunct="1">
+              <a:defRPr sz="1800" kern="1200">
+                <a:solidFill>
+                  <a:schemeClr val="tx1"/>
+                </a:solidFill>
+                <a:latin typeface="+mn-lt"/>
+                <a:ea typeface="+mn-ea"/>
+                <a:cs typeface="+mn-cs"/>
+              </a:defRPr>
+            </a:lvl4pPr>
+            <a:lvl5pPr marL="1828800" algn="l" defTabSz="457200" rtl="0" eaLnBrk="1" latinLnBrk="0" hangingPunct="1">
+              <a:defRPr sz="1800" kern="1200">
+                <a:solidFill>
+                  <a:schemeClr val="tx1"/>
+                </a:solidFill>
+                <a:latin typeface="+mn-lt"/>
+                <a:ea typeface="+mn-ea"/>
+                <a:cs typeface="+mn-cs"/>
+              </a:defRPr>
+            </a:lvl5pPr>
+            <a:lvl6pPr marL="2286000" algn="l" defTabSz="457200" rtl="0" eaLnBrk="1" latinLnBrk="0" hangingPunct="1">
+              <a:defRPr sz="1800" kern="1200">
+                <a:solidFill>
+                  <a:schemeClr val="tx1"/>
+                </a:solidFill>
+                <a:latin typeface="+mn-lt"/>
+                <a:ea typeface="+mn-ea"/>
+                <a:cs typeface="+mn-cs"/>
+              </a:defRPr>
+            </a:lvl6pPr>
+            <a:lvl7pPr marL="2743200" algn="l" defTabSz="457200" rtl="0" eaLnBrk="1" latinLnBrk="0" hangingPunct="1">
+              <a:defRPr sz="1800" kern="1200">
+                <a:solidFill>
+                  <a:schemeClr val="tx1"/>
+                </a:solidFill>
+                <a:latin typeface="+mn-lt"/>
+                <a:ea typeface="+mn-ea"/>
+                <a:cs typeface="+mn-cs"/>
+              </a:defRPr>
+            </a:lvl7pPr>
+            <a:lvl8pPr marL="3200400" algn="l" defTabSz="457200" rtl="0" eaLnBrk="1" latinLnBrk="0" hangingPunct="1">
+              <a:defRPr sz="1800" kern="1200">
+                <a:solidFill>
+                  <a:schemeClr val="tx1"/>
+                </a:solidFill>
+                <a:latin typeface="+mn-lt"/>
+                <a:ea typeface="+mn-ea"/>
+                <a:cs typeface="+mn-cs"/>
+              </a:defRPr>
+            </a:lvl8pPr>
+            <a:lvl9pPr marL="3657600" algn="l" defTabSz="457200" rtl="0" eaLnBrk="1" latinLnBrk="0" hangingPunct="1">
+              <a:defRPr sz="1800" kern="1200">
+                <a:solidFill>
+                  <a:schemeClr val="tx1"/>
+                </a:solidFill>
+                <a:latin typeface="+mn-lt"/>
+                <a:ea typeface="+mn-ea"/>
+                <a:cs typeface="+mn-cs"/>
+              </a:defRPr>
+            </a:lvl9pPr>
+          </a:lstStyle>
+          <a:p>
+            <a:r>
+              <a:rPr lang="pt-BR" sz="1100" dirty="0"/>
+              <a:t>TCC – Arquitetura de Software Distribuído – PUC-MG</a:t>
+            </a:r>
+          </a:p>
+        </p:txBody>
+      </p:sp>
     </p:spTree>
     <p:extLst>
       <p:ext uri="{BB962C8B-B14F-4D97-AF65-F5344CB8AC3E}">

</xml_diff>